<commit_message>
Full restructure of the project.
</commit_message>
<xml_diff>
--- a/presentations/master_2.pptx
+++ b/presentations/master_2.pptx
@@ -5,7 +5,7 @@
     <p:sldMasterId id="2147483660" r:id="rId1"/>
   </p:sldMasterIdLst>
   <p:notesMasterIdLst>
-    <p:notesMasterId r:id="rId19"/>
+    <p:notesMasterId r:id="rId17"/>
   </p:notesMasterIdLst>
   <p:sldIdLst>
     <p:sldId id="256" r:id="rId2"/>
@@ -15,16 +15,14 @@
     <p:sldId id="258" r:id="rId6"/>
     <p:sldId id="264" r:id="rId7"/>
     <p:sldId id="272" r:id="rId8"/>
-    <p:sldId id="269" r:id="rId9"/>
-    <p:sldId id="265" r:id="rId10"/>
-    <p:sldId id="270" r:id="rId11"/>
-    <p:sldId id="271" r:id="rId12"/>
-    <p:sldId id="266" r:id="rId13"/>
-    <p:sldId id="267" r:id="rId14"/>
-    <p:sldId id="268" r:id="rId15"/>
-    <p:sldId id="273" r:id="rId16"/>
-    <p:sldId id="274" r:id="rId17"/>
-    <p:sldId id="275" r:id="rId18"/>
+    <p:sldId id="265" r:id="rId9"/>
+    <p:sldId id="270" r:id="rId10"/>
+    <p:sldId id="271" r:id="rId11"/>
+    <p:sldId id="266" r:id="rId12"/>
+    <p:sldId id="267" r:id="rId13"/>
+    <p:sldId id="273" r:id="rId14"/>
+    <p:sldId id="274" r:id="rId15"/>
+    <p:sldId id="275" r:id="rId16"/>
   </p:sldIdLst>
   <p:sldSz cx="12192000" cy="6858000"/>
   <p:notesSz cx="6858000" cy="9144000"/>
@@ -213,7 +211,7 @@
           <a:p>
             <a:fld id="{D4D9CD96-B53D-4A6F-8EE2-FAA477ED814C}" type="datetimeFigureOut">
               <a:rPr lang="en-US" smtClean="0"/>
-              <a:t>6/21/2023</a:t>
+              <a:t>6/22/2023</a:t>
             </a:fld>
             <a:endParaRPr lang="en-US"/>
           </a:p>
@@ -545,7 +543,7 @@
           <a:p>
             <a:fld id="{85EE3780-CEE7-4B8C-8E39-06BEC35C4B5B}" type="slidenum">
               <a:rPr lang="en-US" smtClean="0"/>
-              <a:t>9</a:t>
+              <a:t>8</a:t>
             </a:fld>
             <a:endParaRPr lang="en-US"/>
           </a:p>
@@ -9357,7 +9355,7 @@
           <a:p>
             <a:fld id="{BE5A8A92-5A16-4F0C-8980-8C865FF0C47D}" type="datetimeFigureOut">
               <a:rPr lang="en-US" smtClean="0"/>
-              <a:t>6/21/2023</a:t>
+              <a:t>6/22/2023</a:t>
             </a:fld>
             <a:endParaRPr lang="en-US"/>
           </a:p>
@@ -9564,7 +9562,7 @@
           <a:p>
             <a:fld id="{BE5A8A92-5A16-4F0C-8980-8C865FF0C47D}" type="datetimeFigureOut">
               <a:rPr lang="en-US" smtClean="0"/>
-              <a:t>6/21/2023</a:t>
+              <a:t>6/22/2023</a:t>
             </a:fld>
             <a:endParaRPr lang="en-US"/>
           </a:p>
@@ -9744,7 +9742,7 @@
           <a:p>
             <a:fld id="{BE5A8A92-5A16-4F0C-8980-8C865FF0C47D}" type="datetimeFigureOut">
               <a:rPr lang="en-US" smtClean="0"/>
-              <a:t>6/21/2023</a:t>
+              <a:t>6/22/2023</a:t>
             </a:fld>
             <a:endParaRPr lang="en-US"/>
           </a:p>
@@ -9949,7 +9947,7 @@
           <a:p>
             <a:fld id="{BE5A8A92-5A16-4F0C-8980-8C865FF0C47D}" type="datetimeFigureOut">
               <a:rPr lang="en-US" smtClean="0"/>
-              <a:t>6/21/2023</a:t>
+              <a:t>6/22/2023</a:t>
             </a:fld>
             <a:endParaRPr lang="en-US"/>
           </a:p>
@@ -18847,7 +18845,7 @@
           <a:p>
             <a:fld id="{BE5A8A92-5A16-4F0C-8980-8C865FF0C47D}" type="datetimeFigureOut">
               <a:rPr lang="en-US" smtClean="0"/>
-              <a:t>6/21/2023</a:t>
+              <a:t>6/22/2023</a:t>
             </a:fld>
             <a:endParaRPr lang="en-US"/>
           </a:p>
@@ -19121,7 +19119,7 @@
           <a:p>
             <a:fld id="{BE5A8A92-5A16-4F0C-8980-8C865FF0C47D}" type="datetimeFigureOut">
               <a:rPr lang="en-US" smtClean="0"/>
-              <a:t>6/21/2023</a:t>
+              <a:t>6/22/2023</a:t>
             </a:fld>
             <a:endParaRPr lang="en-US"/>
           </a:p>
@@ -19519,7 +19517,7 @@
           <a:p>
             <a:fld id="{BE5A8A92-5A16-4F0C-8980-8C865FF0C47D}" type="datetimeFigureOut">
               <a:rPr lang="en-US" smtClean="0"/>
-              <a:t>6/21/2023</a:t>
+              <a:t>6/22/2023</a:t>
             </a:fld>
             <a:endParaRPr lang="en-US"/>
           </a:p>
@@ -19637,7 +19635,7 @@
           <a:p>
             <a:fld id="{BE5A8A92-5A16-4F0C-8980-8C865FF0C47D}" type="datetimeFigureOut">
               <a:rPr lang="en-US" smtClean="0"/>
-              <a:t>6/21/2023</a:t>
+              <a:t>6/22/2023</a:t>
             </a:fld>
             <a:endParaRPr lang="en-US"/>
           </a:p>
@@ -19732,7 +19730,7 @@
           <a:p>
             <a:fld id="{BE5A8A92-5A16-4F0C-8980-8C865FF0C47D}" type="datetimeFigureOut">
               <a:rPr lang="en-US" smtClean="0"/>
-              <a:t>6/21/2023</a:t>
+              <a:t>6/22/2023</a:t>
             </a:fld>
             <a:endParaRPr lang="en-US"/>
           </a:p>
@@ -20022,7 +20020,7 @@
           <a:p>
             <a:fld id="{BE5A8A92-5A16-4F0C-8980-8C865FF0C47D}" type="datetimeFigureOut">
               <a:rPr lang="en-US" smtClean="0"/>
-              <a:t>6/21/2023</a:t>
+              <a:t>6/22/2023</a:t>
             </a:fld>
             <a:endParaRPr lang="en-US"/>
           </a:p>
@@ -20302,7 +20300,7 @@
           <a:p>
             <a:fld id="{BE5A8A92-5A16-4F0C-8980-8C865FF0C47D}" type="datetimeFigureOut">
               <a:rPr lang="en-US" smtClean="0"/>
-              <a:t>6/21/2023</a:t>
+              <a:t>6/22/2023</a:t>
             </a:fld>
             <a:endParaRPr lang="en-US"/>
           </a:p>
@@ -20552,7 +20550,7 @@
           <a:p>
             <a:fld id="{BE5A8A92-5A16-4F0C-8980-8C865FF0C47D}" type="datetimeFigureOut">
               <a:rPr lang="en-US" smtClean="0"/>
-              <a:t>6/21/2023</a:t>
+              <a:t>6/22/2023</a:t>
             </a:fld>
             <a:endParaRPr lang="en-US"/>
           </a:p>
@@ -21162,141 +21160,6 @@
           <p:cNvPr id="2" name="Title 1">
             <a:extLst>
               <a:ext uri="{FF2B5EF4-FFF2-40B4-BE49-F238E27FC236}">
-                <a16:creationId xmlns:a16="http://schemas.microsoft.com/office/drawing/2014/main" id="{610B0321-F975-FC37-CF2D-AFD42E10F547}"/>
-              </a:ext>
-            </a:extLst>
-          </p:cNvPr>
-          <p:cNvSpPr>
-            <a:spLocks noGrp="1"/>
-          </p:cNvSpPr>
-          <p:nvPr>
-            <p:ph type="title"/>
-          </p:nvPr>
-        </p:nvSpPr>
-        <p:spPr>
-          <a:xfrm>
-            <a:off x="1024128" y="548640"/>
-            <a:ext cx="9720072" cy="1499616"/>
-          </a:xfrm>
-        </p:spPr>
-        <p:txBody>
-          <a:bodyPr/>
-          <a:lstStyle/>
-          <a:p>
-            <a:r>
-              <a:rPr lang="en-US" dirty="0"/>
-              <a:t>Architecture – second model</a:t>
-            </a:r>
-          </a:p>
-        </p:txBody>
-      </p:sp>
-      <p:pic>
-        <p:nvPicPr>
-          <p:cNvPr id="7" name="Picture 6">
-            <a:extLst>
-              <a:ext uri="{FF2B5EF4-FFF2-40B4-BE49-F238E27FC236}">
-                <a16:creationId xmlns:a16="http://schemas.microsoft.com/office/drawing/2014/main" id="{982C5BAB-1B5E-EBE9-88F6-184B361F5455}"/>
-              </a:ext>
-            </a:extLst>
-          </p:cNvPr>
-          <p:cNvPicPr>
-            <a:picLocks noChangeAspect="1"/>
-          </p:cNvPicPr>
-          <p:nvPr/>
-        </p:nvPicPr>
-        <p:blipFill>
-          <a:blip r:embed="rId2">
-            <a:extLst>
-              <a:ext uri="{28A0092B-C50C-407E-A947-70E740481C1C}">
-                <a14:useLocalDpi xmlns:a14="http://schemas.microsoft.com/office/drawing/2010/main" val="0"/>
-              </a:ext>
-            </a:extLst>
-          </a:blip>
-          <a:stretch>
-            <a:fillRect/>
-          </a:stretch>
-        </p:blipFill>
-        <p:spPr>
-          <a:xfrm>
-            <a:off x="8835362" y="204186"/>
-            <a:ext cx="1510910" cy="6179963"/>
-          </a:xfrm>
-          <a:prstGeom prst="rect">
-            <a:avLst/>
-          </a:prstGeom>
-        </p:spPr>
-      </p:pic>
-      <p:pic>
-        <p:nvPicPr>
-          <p:cNvPr id="9" name="Picture 8">
-            <a:extLst>
-              <a:ext uri="{FF2B5EF4-FFF2-40B4-BE49-F238E27FC236}">
-                <a16:creationId xmlns:a16="http://schemas.microsoft.com/office/drawing/2014/main" id="{6CB3E9EB-E6E0-914D-639E-C2D9356C2561}"/>
-              </a:ext>
-            </a:extLst>
-          </p:cNvPr>
-          <p:cNvPicPr>
-            <a:picLocks noChangeAspect="1"/>
-          </p:cNvPicPr>
-          <p:nvPr/>
-        </p:nvPicPr>
-        <p:blipFill>
-          <a:blip r:embed="rId3">
-            <a:extLst>
-              <a:ext uri="{28A0092B-C50C-407E-A947-70E740481C1C}">
-                <a14:useLocalDpi xmlns:a14="http://schemas.microsoft.com/office/drawing/2010/main" val="0"/>
-              </a:ext>
-            </a:extLst>
-          </a:blip>
-          <a:stretch>
-            <a:fillRect/>
-          </a:stretch>
-        </p:blipFill>
-        <p:spPr>
-          <a:xfrm>
-            <a:off x="2395909" y="2739499"/>
-            <a:ext cx="2533835" cy="2533835"/>
-          </a:xfrm>
-          <a:prstGeom prst="rect">
-            <a:avLst/>
-          </a:prstGeom>
-        </p:spPr>
-      </p:pic>
-    </p:spTree>
-    <p:extLst>
-      <p:ext uri="{BB962C8B-B14F-4D97-AF65-F5344CB8AC3E}">
-        <p14:creationId xmlns:p14="http://schemas.microsoft.com/office/powerpoint/2010/main" val="2300940548"/>
-      </p:ext>
-    </p:extLst>
-  </p:cSld>
-  <p:clrMapOvr>
-    <a:masterClrMapping/>
-  </p:clrMapOvr>
-</p:sld>
-</file>
-
-<file path=ppt/slides/slide11.xml><?xml version="1.0" encoding="utf-8"?>
-<p:sld xmlns:a="http://schemas.openxmlformats.org/drawingml/2006/main" xmlns:r="http://schemas.openxmlformats.org/officeDocument/2006/relationships" xmlns:p="http://schemas.openxmlformats.org/presentationml/2006/main">
-  <p:cSld>
-    <p:spTree>
-      <p:nvGrpSpPr>
-        <p:cNvPr id="1" name=""/>
-        <p:cNvGrpSpPr/>
-        <p:nvPr/>
-      </p:nvGrpSpPr>
-      <p:grpSpPr>
-        <a:xfrm>
-          <a:off x="0" y="0"/>
-          <a:ext cx="0" cy="0"/>
-          <a:chOff x="0" y="0"/>
-          <a:chExt cx="0" cy="0"/>
-        </a:xfrm>
-      </p:grpSpPr>
-      <p:sp>
-        <p:nvSpPr>
-          <p:cNvPr id="2" name="Title 1">
-            <a:extLst>
-              <a:ext uri="{FF2B5EF4-FFF2-40B4-BE49-F238E27FC236}">
                 <a16:creationId xmlns:a16="http://schemas.microsoft.com/office/drawing/2014/main" id="{00FD7777-FBEC-0DBD-5C30-8E3F7402CC4D}"/>
               </a:ext>
             </a:extLst>
@@ -21405,7 +21268,7 @@
 </p:sld>
 </file>
 
-<file path=ppt/slides/slide12.xml><?xml version="1.0" encoding="utf-8"?>
+<file path=ppt/slides/slide11.xml><?xml version="1.0" encoding="utf-8"?>
 <p:sld xmlns:a="http://schemas.openxmlformats.org/drawingml/2006/main" xmlns:r="http://schemas.openxmlformats.org/officeDocument/2006/relationships" xmlns:p="http://schemas.openxmlformats.org/presentationml/2006/main">
   <p:cSld>
     <p:spTree>
@@ -21746,7 +21609,7 @@
 </p:sld>
 </file>
 
-<file path=ppt/slides/slide13.xml><?xml version="1.0" encoding="utf-8"?>
+<file path=ppt/slides/slide12.xml><?xml version="1.0" encoding="utf-8"?>
 <p:sld xmlns:a="http://schemas.openxmlformats.org/drawingml/2006/main" xmlns:r="http://schemas.openxmlformats.org/officeDocument/2006/relationships" xmlns:p="http://schemas.openxmlformats.org/presentationml/2006/main">
   <p:cSld>
     <p:spTree>
@@ -22280,149 +22143,7 @@
 </p:sld>
 </file>
 
-<file path=ppt/slides/slide14.xml><?xml version="1.0" encoding="utf-8"?>
-<p:sld xmlns:a="http://schemas.openxmlformats.org/drawingml/2006/main" xmlns:r="http://schemas.openxmlformats.org/officeDocument/2006/relationships" xmlns:p="http://schemas.openxmlformats.org/presentationml/2006/main">
-  <p:cSld>
-    <p:spTree>
-      <p:nvGrpSpPr>
-        <p:cNvPr id="1" name=""/>
-        <p:cNvGrpSpPr/>
-        <p:nvPr/>
-      </p:nvGrpSpPr>
-      <p:grpSpPr>
-        <a:xfrm>
-          <a:off x="0" y="0"/>
-          <a:ext cx="0" cy="0"/>
-          <a:chOff x="0" y="0"/>
-          <a:chExt cx="0" cy="0"/>
-        </a:xfrm>
-      </p:grpSpPr>
-      <p:sp>
-        <p:nvSpPr>
-          <p:cNvPr id="2" name="Title 1">
-            <a:extLst>
-              <a:ext uri="{FF2B5EF4-FFF2-40B4-BE49-F238E27FC236}">
-                <a16:creationId xmlns:a16="http://schemas.microsoft.com/office/drawing/2014/main" id="{A7243588-E710-8023-7E0D-0A4E5B58BBF8}"/>
-              </a:ext>
-            </a:extLst>
-          </p:cNvPr>
-          <p:cNvSpPr>
-            <a:spLocks noGrp="1"/>
-          </p:cNvSpPr>
-          <p:nvPr>
-            <p:ph type="title"/>
-          </p:nvPr>
-        </p:nvSpPr>
-        <p:spPr/>
-        <p:txBody>
-          <a:bodyPr/>
-          <a:lstStyle/>
-          <a:p>
-            <a:r>
-              <a:rPr lang="en-US" dirty="0"/>
-              <a:t>Future ideas</a:t>
-            </a:r>
-          </a:p>
-        </p:txBody>
-      </p:sp>
-      <p:sp>
-        <p:nvSpPr>
-          <p:cNvPr id="3" name="Content Placeholder 2">
-            <a:extLst>
-              <a:ext uri="{FF2B5EF4-FFF2-40B4-BE49-F238E27FC236}">
-                <a16:creationId xmlns:a16="http://schemas.microsoft.com/office/drawing/2014/main" id="{BF107738-93FF-4D5B-426B-76B3F786EA1C}"/>
-              </a:ext>
-            </a:extLst>
-          </p:cNvPr>
-          <p:cNvSpPr>
-            <a:spLocks noGrp="1"/>
-          </p:cNvSpPr>
-          <p:nvPr>
-            <p:ph idx="1"/>
-          </p:nvPr>
-        </p:nvSpPr>
-        <p:spPr/>
-        <p:txBody>
-          <a:bodyPr>
-            <a:normAutofit fontScale="92500" lnSpcReduction="20000"/>
-          </a:bodyPr>
-          <a:lstStyle/>
-          <a:p>
-            <a:r>
-              <a:rPr lang="en-US" dirty="0"/>
-              <a:t>Already working on a public accessible API for maze generation using the provided techniques and models</a:t>
-            </a:r>
-          </a:p>
-          <a:p>
-            <a:r>
-              <a:rPr lang="en-US" dirty="0"/>
-              <a:t>Using Autoencoders</a:t>
-            </a:r>
-          </a:p>
-          <a:p>
-            <a:r>
-              <a:rPr lang="en-US" dirty="0"/>
-              <a:t>Using Genetic Algorithms to evolve mazes</a:t>
-            </a:r>
-          </a:p>
-          <a:p>
-            <a:r>
-              <a:rPr lang="en-US" dirty="0"/>
-              <a:t>Aiming for 4 variations for models: small D, small G, small D big G, big D, small G, big D big G over a set of predefined architectures (inspired by the cross-validation approach)</a:t>
-            </a:r>
-          </a:p>
-          <a:p>
-            <a:r>
-              <a:rPr lang="en-US" dirty="0"/>
-              <a:t>The aim is to build a fast method for creating both 2D and 3D models. For the 3D models I plan to use the API in a separate application</a:t>
-            </a:r>
-          </a:p>
-          <a:p>
-            <a:r>
-              <a:rPr lang="en-US" dirty="0"/>
-              <a:t>Other ideas: </a:t>
-            </a:r>
-          </a:p>
-          <a:p>
-            <a:pPr lvl="1"/>
-            <a:r>
-              <a:rPr lang="en-US" dirty="0"/>
-              <a:t>infinite mazes generated by patches instead of a whole grid at once</a:t>
-            </a:r>
-          </a:p>
-          <a:p>
-            <a:pPr lvl="1"/>
-            <a:r>
-              <a:rPr lang="en-US" dirty="0"/>
-              <a:t>Using NN designed for graph generation</a:t>
-            </a:r>
-          </a:p>
-          <a:p>
-            <a:pPr lvl="1"/>
-            <a:r>
-              <a:rPr lang="en-US" dirty="0"/>
-              <a:t>Using GANs aimed not at image creation, but actual “maze” data</a:t>
-            </a:r>
-          </a:p>
-          <a:p>
-            <a:endParaRPr lang="en-US" dirty="0"/>
-          </a:p>
-        </p:txBody>
-      </p:sp>
-    </p:spTree>
-    <p:extLst>
-      <p:ext uri="{BB962C8B-B14F-4D97-AF65-F5344CB8AC3E}">
-        <p14:creationId xmlns:p14="http://schemas.microsoft.com/office/powerpoint/2010/main" val="831447615"/>
-      </p:ext>
-    </p:extLst>
-  </p:cSld>
-  <p:clrMapOvr>
-    <a:masterClrMapping/>
-  </p:clrMapOvr>
-</p:sld>
-</file>
-
-<file path=ppt/slides/slide15.xml><?xml version="1.0" encoding="utf-8"?>
+<file path=ppt/slides/slide13.xml><?xml version="1.0" encoding="utf-8"?>
 <p:sld xmlns:a="http://schemas.openxmlformats.org/drawingml/2006/main" xmlns:r="http://schemas.openxmlformats.org/officeDocument/2006/relationships" xmlns:p="http://schemas.openxmlformats.org/presentationml/2006/main">
   <p:cSld>
     <p:spTree>
@@ -22553,7 +22274,7 @@
 </p:sld>
 </file>
 
-<file path=ppt/slides/slide16.xml><?xml version="1.0" encoding="utf-8"?>
+<file path=ppt/slides/slide14.xml><?xml version="1.0" encoding="utf-8"?>
 <p:sld xmlns:a="http://schemas.openxmlformats.org/drawingml/2006/main" xmlns:r="http://schemas.openxmlformats.org/officeDocument/2006/relationships" xmlns:p="http://schemas.openxmlformats.org/presentationml/2006/main">
   <p:cSld>
     <p:spTree>
@@ -22676,7 +22397,7 @@
 </p:sld>
 </file>
 
-<file path=ppt/slides/slide17.xml><?xml version="1.0" encoding="utf-8"?>
+<file path=ppt/slides/slide15.xml><?xml version="1.0" encoding="utf-8"?>
 <p:sld xmlns:a="http://schemas.openxmlformats.org/drawingml/2006/main" xmlns:r="http://schemas.openxmlformats.org/officeDocument/2006/relationships" xmlns:p="http://schemas.openxmlformats.org/presentationml/2006/main">
   <p:cSld>
     <p:spTree>
@@ -23848,6 +23569,53 @@
           </a:p>
         </p:txBody>
       </p:sp>
+      <p:pic>
+        <p:nvPicPr>
+          <p:cNvPr id="4" name="Picture 4" descr="Generative Adversarial Network (GAN) - GeeksforGeeks">
+            <a:extLst>
+              <a:ext uri="{FF2B5EF4-FFF2-40B4-BE49-F238E27FC236}">
+                <a16:creationId xmlns:a16="http://schemas.microsoft.com/office/drawing/2014/main" id="{D7F316DB-AE41-FF03-7616-BD213C01CDF6}"/>
+              </a:ext>
+            </a:extLst>
+          </p:cNvPr>
+          <p:cNvPicPr>
+            <a:picLocks noChangeAspect="1" noChangeArrowheads="1"/>
+          </p:cNvPicPr>
+          <p:nvPr/>
+        </p:nvPicPr>
+        <p:blipFill>
+          <a:blip r:embed="rId2">
+            <a:extLst>
+              <a:ext uri="{28A0092B-C50C-407E-A947-70E740481C1C}">
+                <a14:useLocalDpi xmlns:a14="http://schemas.microsoft.com/office/drawing/2010/main" val="0"/>
+              </a:ext>
+            </a:extLst>
+          </a:blip>
+          <a:srcRect/>
+          <a:stretch>
+            <a:fillRect/>
+          </a:stretch>
+        </p:blipFill>
+        <p:spPr bwMode="auto">
+          <a:xfrm>
+            <a:off x="3331457" y="3400418"/>
+            <a:ext cx="5529085" cy="3110110"/>
+          </a:xfrm>
+          <a:prstGeom prst="rect">
+            <a:avLst/>
+          </a:prstGeom>
+          <a:noFill/>
+          <a:extLst>
+            <a:ext uri="{909E8E84-426E-40DD-AFC4-6F175D3DCCD1}">
+              <a14:hiddenFill xmlns:a14="http://schemas.microsoft.com/office/drawing/2010/main">
+                <a:solidFill>
+                  <a:srgbClr val="FFFFFF"/>
+                </a:solidFill>
+              </a14:hiddenFill>
+            </a:ext>
+          </a:extLst>
+        </p:spPr>
+      </p:pic>
       <p:sp>
         <p:nvSpPr>
           <p:cNvPr id="3" name="Content Placeholder 2">
@@ -24058,112 +23826,6 @@
           <p:cNvPr id="2" name="Title 1">
             <a:extLst>
               <a:ext uri="{FF2B5EF4-FFF2-40B4-BE49-F238E27FC236}">
-                <a16:creationId xmlns:a16="http://schemas.microsoft.com/office/drawing/2014/main" id="{CB5D59C3-63FF-F45A-C4C1-A56148333AF9}"/>
-              </a:ext>
-            </a:extLst>
-          </p:cNvPr>
-          <p:cNvSpPr>
-            <a:spLocks noGrp="1"/>
-          </p:cNvSpPr>
-          <p:nvPr>
-            <p:ph type="title"/>
-          </p:nvPr>
-        </p:nvSpPr>
-        <p:spPr/>
-        <p:txBody>
-          <a:bodyPr/>
-          <a:lstStyle/>
-          <a:p>
-            <a:r>
-              <a:rPr lang="en-GB" dirty="0"/>
-              <a:t>New approach: GANs</a:t>
-            </a:r>
-            <a:endParaRPr lang="en-US" dirty="0"/>
-          </a:p>
-        </p:txBody>
-      </p:sp>
-      <p:pic>
-        <p:nvPicPr>
-          <p:cNvPr id="1028" name="Picture 4" descr="Generative Adversarial Network (GAN) - GeeksforGeeks">
-            <a:extLst>
-              <a:ext uri="{FF2B5EF4-FFF2-40B4-BE49-F238E27FC236}">
-                <a16:creationId xmlns:a16="http://schemas.microsoft.com/office/drawing/2014/main" id="{6814AA40-5A63-6280-7A25-D13C56261CFC}"/>
-              </a:ext>
-            </a:extLst>
-          </p:cNvPr>
-          <p:cNvPicPr>
-            <a:picLocks noChangeAspect="1" noChangeArrowheads="1"/>
-          </p:cNvPicPr>
-          <p:nvPr/>
-        </p:nvPicPr>
-        <p:blipFill>
-          <a:blip r:embed="rId2">
-            <a:extLst>
-              <a:ext uri="{28A0092B-C50C-407E-A947-70E740481C1C}">
-                <a14:useLocalDpi xmlns:a14="http://schemas.microsoft.com/office/drawing/2010/main" val="0"/>
-              </a:ext>
-            </a:extLst>
-          </a:blip>
-          <a:srcRect/>
-          <a:stretch>
-            <a:fillRect/>
-          </a:stretch>
-        </p:blipFill>
-        <p:spPr bwMode="auto">
-          <a:xfrm>
-            <a:off x="1666042" y="1619381"/>
-            <a:ext cx="8859915" cy="4983702"/>
-          </a:xfrm>
-          <a:prstGeom prst="rect">
-            <a:avLst/>
-          </a:prstGeom>
-          <a:noFill/>
-          <a:extLst>
-            <a:ext uri="{909E8E84-426E-40DD-AFC4-6F175D3DCCD1}">
-              <a14:hiddenFill xmlns:a14="http://schemas.microsoft.com/office/drawing/2010/main">
-                <a:solidFill>
-                  <a:srgbClr val="FFFFFF"/>
-                </a:solidFill>
-              </a14:hiddenFill>
-            </a:ext>
-          </a:extLst>
-        </p:spPr>
-      </p:pic>
-    </p:spTree>
-    <p:extLst>
-      <p:ext uri="{BB962C8B-B14F-4D97-AF65-F5344CB8AC3E}">
-        <p14:creationId xmlns:p14="http://schemas.microsoft.com/office/powerpoint/2010/main" val="1618456153"/>
-      </p:ext>
-    </p:extLst>
-  </p:cSld>
-  <p:clrMapOvr>
-    <a:masterClrMapping/>
-  </p:clrMapOvr>
-</p:sld>
-</file>
-
-<file path=ppt/slides/slide9.xml><?xml version="1.0" encoding="utf-8"?>
-<p:sld xmlns:a="http://schemas.openxmlformats.org/drawingml/2006/main" xmlns:r="http://schemas.openxmlformats.org/officeDocument/2006/relationships" xmlns:p="http://schemas.openxmlformats.org/presentationml/2006/main">
-  <p:cSld>
-    <p:spTree>
-      <p:nvGrpSpPr>
-        <p:cNvPr id="1" name=""/>
-        <p:cNvGrpSpPr/>
-        <p:nvPr/>
-      </p:nvGrpSpPr>
-      <p:grpSpPr>
-        <a:xfrm>
-          <a:off x="0" y="0"/>
-          <a:ext cx="0" cy="0"/>
-          <a:chOff x="0" y="0"/>
-          <a:chExt cx="0" cy="0"/>
-        </a:xfrm>
-      </p:grpSpPr>
-      <p:sp>
-        <p:nvSpPr>
-          <p:cNvPr id="2" name="Title 1">
-            <a:extLst>
-              <a:ext uri="{FF2B5EF4-FFF2-40B4-BE49-F238E27FC236}">
                 <a16:creationId xmlns:a16="http://schemas.microsoft.com/office/drawing/2014/main" id="{2BF20272-68DC-76B6-30F7-9C4F50C4F440}"/>
               </a:ext>
             </a:extLst>
@@ -24268,6 +23930,141 @@
     <p:extLst>
       <p:ext uri="{BB962C8B-B14F-4D97-AF65-F5344CB8AC3E}">
         <p14:creationId xmlns:p14="http://schemas.microsoft.com/office/powerpoint/2010/main" val="2412505348"/>
+      </p:ext>
+    </p:extLst>
+  </p:cSld>
+  <p:clrMapOvr>
+    <a:masterClrMapping/>
+  </p:clrMapOvr>
+</p:sld>
+</file>
+
+<file path=ppt/slides/slide9.xml><?xml version="1.0" encoding="utf-8"?>
+<p:sld xmlns:a="http://schemas.openxmlformats.org/drawingml/2006/main" xmlns:r="http://schemas.openxmlformats.org/officeDocument/2006/relationships" xmlns:p="http://schemas.openxmlformats.org/presentationml/2006/main">
+  <p:cSld>
+    <p:spTree>
+      <p:nvGrpSpPr>
+        <p:cNvPr id="1" name=""/>
+        <p:cNvGrpSpPr/>
+        <p:nvPr/>
+      </p:nvGrpSpPr>
+      <p:grpSpPr>
+        <a:xfrm>
+          <a:off x="0" y="0"/>
+          <a:ext cx="0" cy="0"/>
+          <a:chOff x="0" y="0"/>
+          <a:chExt cx="0" cy="0"/>
+        </a:xfrm>
+      </p:grpSpPr>
+      <p:sp>
+        <p:nvSpPr>
+          <p:cNvPr id="2" name="Title 1">
+            <a:extLst>
+              <a:ext uri="{FF2B5EF4-FFF2-40B4-BE49-F238E27FC236}">
+                <a16:creationId xmlns:a16="http://schemas.microsoft.com/office/drawing/2014/main" id="{610B0321-F975-FC37-CF2D-AFD42E10F547}"/>
+              </a:ext>
+            </a:extLst>
+          </p:cNvPr>
+          <p:cNvSpPr>
+            <a:spLocks noGrp="1"/>
+          </p:cNvSpPr>
+          <p:nvPr>
+            <p:ph type="title"/>
+          </p:nvPr>
+        </p:nvSpPr>
+        <p:spPr>
+          <a:xfrm>
+            <a:off x="1024128" y="548640"/>
+            <a:ext cx="9720072" cy="1499616"/>
+          </a:xfrm>
+        </p:spPr>
+        <p:txBody>
+          <a:bodyPr/>
+          <a:lstStyle/>
+          <a:p>
+            <a:r>
+              <a:rPr lang="en-US" dirty="0"/>
+              <a:t>Architecture – second model</a:t>
+            </a:r>
+          </a:p>
+        </p:txBody>
+      </p:sp>
+      <p:pic>
+        <p:nvPicPr>
+          <p:cNvPr id="7" name="Picture 6">
+            <a:extLst>
+              <a:ext uri="{FF2B5EF4-FFF2-40B4-BE49-F238E27FC236}">
+                <a16:creationId xmlns:a16="http://schemas.microsoft.com/office/drawing/2014/main" id="{982C5BAB-1B5E-EBE9-88F6-184B361F5455}"/>
+              </a:ext>
+            </a:extLst>
+          </p:cNvPr>
+          <p:cNvPicPr>
+            <a:picLocks noChangeAspect="1"/>
+          </p:cNvPicPr>
+          <p:nvPr/>
+        </p:nvPicPr>
+        <p:blipFill>
+          <a:blip r:embed="rId2">
+            <a:extLst>
+              <a:ext uri="{28A0092B-C50C-407E-A947-70E740481C1C}">
+                <a14:useLocalDpi xmlns:a14="http://schemas.microsoft.com/office/drawing/2010/main" val="0"/>
+              </a:ext>
+            </a:extLst>
+          </a:blip>
+          <a:stretch>
+            <a:fillRect/>
+          </a:stretch>
+        </p:blipFill>
+        <p:spPr>
+          <a:xfrm>
+            <a:off x="8835362" y="204186"/>
+            <a:ext cx="1510910" cy="6179963"/>
+          </a:xfrm>
+          <a:prstGeom prst="rect">
+            <a:avLst/>
+          </a:prstGeom>
+        </p:spPr>
+      </p:pic>
+      <p:pic>
+        <p:nvPicPr>
+          <p:cNvPr id="9" name="Picture 8">
+            <a:extLst>
+              <a:ext uri="{FF2B5EF4-FFF2-40B4-BE49-F238E27FC236}">
+                <a16:creationId xmlns:a16="http://schemas.microsoft.com/office/drawing/2014/main" id="{6CB3E9EB-E6E0-914D-639E-C2D9356C2561}"/>
+              </a:ext>
+            </a:extLst>
+          </p:cNvPr>
+          <p:cNvPicPr>
+            <a:picLocks noChangeAspect="1"/>
+          </p:cNvPicPr>
+          <p:nvPr/>
+        </p:nvPicPr>
+        <p:blipFill>
+          <a:blip r:embed="rId3">
+            <a:extLst>
+              <a:ext uri="{28A0092B-C50C-407E-A947-70E740481C1C}">
+                <a14:useLocalDpi xmlns:a14="http://schemas.microsoft.com/office/drawing/2010/main" val="0"/>
+              </a:ext>
+            </a:extLst>
+          </a:blip>
+          <a:stretch>
+            <a:fillRect/>
+          </a:stretch>
+        </p:blipFill>
+        <p:spPr>
+          <a:xfrm>
+            <a:off x="2395909" y="2739499"/>
+            <a:ext cx="2533835" cy="2533835"/>
+          </a:xfrm>
+          <a:prstGeom prst="rect">
+            <a:avLst/>
+          </a:prstGeom>
+        </p:spPr>
+      </p:pic>
+    </p:spTree>
+    <p:extLst>
+      <p:ext uri="{BB962C8B-B14F-4D97-AF65-F5344CB8AC3E}">
+        <p14:creationId xmlns:p14="http://schemas.microsoft.com/office/powerpoint/2010/main" val="2300940548"/>
       </p:ext>
     </p:extLst>
   </p:cSld>

</xml_diff>